<commit_message>
feat: third slide modified as per new template
</commit_message>
<xml_diff>
--- a/output_presentation.pptx
+++ b/output_presentation.pptx
@@ -647,7 +647,7 @@
           <a:lstStyle/>
           <a:p>
             <a:r>
-              <a:t>This is the third slide, featuring four images on the left (one large, three small) and a title with content (including bullets) on the right.</a:t>
+              <a:t>This is the third slide, featuring an image with a caption on the left and a title with content on the right.</a:t>
             </a:r>
           </a:p>
         </p:txBody>
@@ -4054,14 +4054,14 @@
       <p:grpSpPr/>
       <p:sp>
         <p:nvSpPr>
-          <p:cNvPr id="2" name="Slide3TopLeftImage"/>
+          <p:cNvPr id="2" name="Slide3LeftImage"/>
           <p:cNvSpPr/>
           <p:nvPr/>
         </p:nvSpPr>
         <p:spPr>
           <a:xfrm>
             <a:off x="457200" y="457200"/>
-            <a:ext cx="5486400" cy="3200400"/>
+            <a:ext cx="5486400" cy="5029200"/>
           </a:xfrm>
           <a:prstGeom prst="rect">
             <a:avLst/>
@@ -4088,144 +4088,21 @@
             <a:pPr algn="ctr"/>
             <a:r>
               <a:rPr sz="1400"/>
-              <a:t>Slide3 Top Left Image Placeholder</a:t>
-            </a:r>
-          </a:p>
-        </p:txBody>
-      </p:sp>
-      <p:sp>
-        <p:nvSpPr>
-          <p:cNvPr id="3" name="Slide3BottomLeftImage1"/>
-          <p:cNvSpPr/>
-          <p:nvPr/>
-        </p:nvSpPr>
-        <p:spPr>
-          <a:xfrm>
-            <a:off x="457200" y="3749039"/>
-            <a:ext cx="5486400" cy="914400"/>
-          </a:xfrm>
-          <a:prstGeom prst="rect">
-            <a:avLst/>
-          </a:prstGeom>
-        </p:spPr>
-        <p:style>
-          <a:lnRef idx="1">
-            <a:schemeClr val="accent1"/>
-          </a:lnRef>
-          <a:fillRef idx="3">
-            <a:schemeClr val="accent1"/>
-          </a:fillRef>
-          <a:effectRef idx="2">
-            <a:schemeClr val="accent1"/>
-          </a:effectRef>
-          <a:fontRef idx="minor">
-            <a:schemeClr val="lt1"/>
-          </a:fontRef>
-        </p:style>
-        <p:txBody>
-          <a:bodyPr rtlCol="0" anchor="ctr"/>
-          <a:lstStyle/>
-          <a:p>
-            <a:pPr algn="ctr"/>
-            <a:r>
-              <a:rPr sz="1200"/>
-              <a:t>Slide3 Bottom Left Image 1 Placeholder</a:t>
-            </a:r>
-          </a:p>
-        </p:txBody>
-      </p:sp>
-      <p:sp>
-        <p:nvSpPr>
-          <p:cNvPr id="4" name="Slide3BottomLeftImage2"/>
-          <p:cNvSpPr/>
-          <p:nvPr/>
-        </p:nvSpPr>
-        <p:spPr>
-          <a:xfrm>
-            <a:off x="457200" y="4754880"/>
-            <a:ext cx="5486400" cy="914400"/>
-          </a:xfrm>
-          <a:prstGeom prst="rect">
-            <a:avLst/>
-          </a:prstGeom>
-        </p:spPr>
-        <p:style>
-          <a:lnRef idx="1">
-            <a:schemeClr val="accent1"/>
-          </a:lnRef>
-          <a:fillRef idx="3">
-            <a:schemeClr val="accent1"/>
-          </a:fillRef>
-          <a:effectRef idx="2">
-            <a:schemeClr val="accent1"/>
-          </a:effectRef>
-          <a:fontRef idx="minor">
-            <a:schemeClr val="lt1"/>
-          </a:fontRef>
-        </p:style>
-        <p:txBody>
-          <a:bodyPr rtlCol="0" anchor="ctr"/>
-          <a:lstStyle/>
-          <a:p>
-            <a:pPr algn="ctr"/>
-            <a:r>
-              <a:rPr sz="1200"/>
-              <a:t>Slide3 Bottom Left Image 2 Placeholder</a:t>
-            </a:r>
-          </a:p>
-        </p:txBody>
-      </p:sp>
-      <p:sp>
-        <p:nvSpPr>
-          <p:cNvPr id="5" name="Slide3BottomLeftImage3"/>
-          <p:cNvSpPr/>
-          <p:nvPr/>
-        </p:nvSpPr>
-        <p:spPr>
-          <a:xfrm>
-            <a:off x="457200" y="5760720"/>
-            <a:ext cx="5486400" cy="914400"/>
-          </a:xfrm>
-          <a:prstGeom prst="rect">
-            <a:avLst/>
-          </a:prstGeom>
-        </p:spPr>
-        <p:style>
-          <a:lnRef idx="1">
-            <a:schemeClr val="accent1"/>
-          </a:lnRef>
-          <a:fillRef idx="3">
-            <a:schemeClr val="accent1"/>
-          </a:fillRef>
-          <a:effectRef idx="2">
-            <a:schemeClr val="accent1"/>
-          </a:effectRef>
-          <a:fontRef idx="minor">
-            <a:schemeClr val="lt1"/>
-          </a:fontRef>
-        </p:style>
-        <p:txBody>
-          <a:bodyPr rtlCol="0" anchor="ctr"/>
-          <a:lstStyle/>
-          <a:p>
-            <a:pPr algn="ctr"/>
-            <a:r>
-              <a:rPr sz="1200"/>
-              <a:t>Slide3 Bottom Left Image 3 Placeholder</a:t>
-            </a:r>
-          </a:p>
-        </p:txBody>
-      </p:sp>
-      <p:sp>
-        <p:nvSpPr>
-          <p:cNvPr id="6" name="Slide3RightTitle"/>
+              <a:t>Slide3 Left Image Placeholder</a:t>
+            </a:r>
+          </a:p>
+        </p:txBody>
+      </p:sp>
+      <p:sp>
+        <p:nvSpPr>
+          <p:cNvPr id="3" name="Slide3LeftCaption"/>
           <p:cNvSpPr txBox="1"/>
           <p:nvPr/>
         </p:nvSpPr>
         <p:spPr>
           <a:xfrm>
-            <a:off x="6245352" y="457200"/>
-            <a:ext cx="5486400" cy="457200"/>
+            <a:off x="457200" y="5577840"/>
+            <a:ext cx="5486400" cy="914400"/>
           </a:xfrm>
           <a:prstGeom prst="rect">
             <a:avLst/>
@@ -4240,6 +4117,36 @@
           <a:p>
             <a:pPr algn="l"/>
             <a:r>
+              <a:rPr sz="1200"/>
+              <a:t>Slide3 Left Caption Placeholder</a:t>
+            </a:r>
+          </a:p>
+        </p:txBody>
+      </p:sp>
+      <p:sp>
+        <p:nvSpPr>
+          <p:cNvPr id="4" name="Slide3RightTitle"/>
+          <p:cNvSpPr txBox="1"/>
+          <p:nvPr/>
+        </p:nvSpPr>
+        <p:spPr>
+          <a:xfrm>
+            <a:off x="6245352" y="457200"/>
+            <a:ext cx="5486400" cy="457200"/>
+          </a:xfrm>
+          <a:prstGeom prst="rect">
+            <a:avLst/>
+          </a:prstGeom>
+          <a:noFill/>
+        </p:spPr>
+        <p:txBody>
+          <a:bodyPr wrap="square">
+            <a:spAutoFit/>
+          </a:bodyPr>
+          <a:lstStyle/>
+          <a:p>
+            <a:pPr algn="l"/>
+            <a:r>
               <a:rPr sz="1800" b="1"/>
               <a:t>Slide3 Right Title Placeholder</a:t>
             </a:r>
@@ -4248,7 +4155,7 @@
       </p:sp>
       <p:sp>
         <p:nvSpPr>
-          <p:cNvPr id="7" name="Slide3RightContent"/>
+          <p:cNvPr id="5" name="Slide3RightContent"/>
           <p:cNvSpPr txBox="1"/>
           <p:nvPr/>
         </p:nvSpPr>
@@ -4323,7 +4230,6 @@
             <a:spAutoFit/>
           </a:bodyPr>
           <a:lstStyle/>
-          <a:p/>
           <a:p>
             <a:pPr algn="l"/>
             <a:r>
@@ -4358,7 +4264,6 @@
             <a:spAutoFit/>
           </a:bodyPr>
           <a:lstStyle/>
-          <a:p/>
           <a:p>
             <a:pPr algn="l"/>
             <a:r>
@@ -4393,7 +4298,6 @@
             <a:spAutoFit/>
           </a:bodyPr>
           <a:lstStyle/>
-          <a:p/>
           <a:p>
             <a:pPr algn="l"/>
             <a:r>
@@ -4428,7 +4332,6 @@
             <a:spAutoFit/>
           </a:bodyPr>
           <a:lstStyle/>
-          <a:p/>
           <a:p>
             <a:pPr algn="l"/>
             <a:r>
@@ -4537,7 +4440,6 @@
             <a:spAutoFit/>
           </a:bodyPr>
           <a:lstStyle/>
-          <a:p/>
           <a:p>
             <a:pPr algn="l"/>
             <a:r>
@@ -4572,7 +4474,6 @@
             <a:spAutoFit/>
           </a:bodyPr>
           <a:lstStyle/>
-          <a:p/>
           <a:p>
             <a:pPr algn="l"/>
             <a:r>
@@ -4607,7 +4508,6 @@
             <a:spAutoFit/>
           </a:bodyPr>
           <a:lstStyle/>
-          <a:p/>
           <a:p>
             <a:pPr algn="l"/>
             <a:r>
@@ -4642,7 +4542,6 @@
             <a:spAutoFit/>
           </a:bodyPr>
           <a:lstStyle/>
-          <a:p/>
           <a:p>
             <a:pPr algn="l"/>
             <a:r>
@@ -4708,14 +4607,14 @@
       <p:grpSpPr/>
       <p:sp>
         <p:nvSpPr>
-          <p:cNvPr id="6" name="Slide3RightTitle"/>
+          <p:cNvPr id="3" name="Slide3LeftCaption"/>
           <p:cNvSpPr txBox="1"/>
           <p:nvPr/>
         </p:nvSpPr>
         <p:spPr>
           <a:xfrm>
-            <a:off x="6245352" y="457200"/>
-            <a:ext cx="5486400" cy="457200"/>
+            <a:off x="457200" y="5577840"/>
+            <a:ext cx="5486400" cy="914400"/>
           </a:xfrm>
           <a:prstGeom prst="rect">
             <a:avLst/>
@@ -4727,7 +4626,40 @@
             <a:spAutoFit/>
           </a:bodyPr>
           <a:lstStyle/>
-          <a:p/>
+          <a:p>
+            <a:pPr algn="l"/>
+            <a:r>
+              <a:rPr sz="1200" b="0">
+                <a:solidFill>
+                  <a:srgbClr val="FFFFFF"/>
+                </a:solidFill>
+              </a:rPr>
+              <a:t>Caption for the image on the left side of the third slide.</a:t>
+            </a:r>
+          </a:p>
+        </p:txBody>
+      </p:sp>
+      <p:sp>
+        <p:nvSpPr>
+          <p:cNvPr id="4" name="Slide3RightTitle"/>
+          <p:cNvSpPr txBox="1"/>
+          <p:nvPr/>
+        </p:nvSpPr>
+        <p:spPr>
+          <a:xfrm>
+            <a:off x="6245352" y="457200"/>
+            <a:ext cx="5486400" cy="457200"/>
+          </a:xfrm>
+          <a:prstGeom prst="rect">
+            <a:avLst/>
+          </a:prstGeom>
+          <a:noFill/>
+        </p:spPr>
+        <p:txBody>
+          <a:bodyPr wrap="square">
+            <a:spAutoFit/>
+          </a:bodyPr>
+          <a:lstStyle/>
           <a:p>
             <a:pPr algn="l"/>
             <a:r>
@@ -4743,7 +4675,7 @@
       </p:sp>
       <p:sp>
         <p:nvSpPr>
-          <p:cNvPr id="7" name="Slide3RightContent"/>
+          <p:cNvPr id="5" name="Slide3RightContent"/>
           <p:cNvSpPr txBox="1"/>
           <p:nvPr/>
         </p:nvSpPr>
@@ -4762,7 +4694,6 @@
             <a:spAutoFit/>
           </a:bodyPr>
           <a:lstStyle/>
-          <a:p/>
           <a:p>
             <a:pPr algn="l"/>
             <a:r>
@@ -4771,50 +4702,14 @@
                   <a:srgbClr val="FFFFFF"/>
                 </a:solidFill>
               </a:rPr>
-              <a:t>This is the main content for the third slide. It provides an overview of the topic being discussed.</a:t>
-            </a:r>
-          </a:p>
-          <a:p>
-            <a:pPr algn="l"/>
-          </a:p>
-          <a:p>
-            <a:pPr algn="l"/>
-            <a:r>
-              <a:rPr sz="1400" b="0">
-                <a:solidFill>
-                  <a:srgbClr val="FFFFFF"/>
-                </a:solidFill>
-              </a:rPr>
-              <a:t>First bullet point with details.</a:t>
-            </a:r>
-          </a:p>
-          <a:p>
-            <a:pPr algn="l"/>
-            <a:r>
-              <a:rPr sz="1400" b="0">
-                <a:solidFill>
-                  <a:srgbClr val="FFFFFF"/>
-                </a:solidFill>
-              </a:rPr>
-              <a:t>Second bullet point with more information.</a:t>
-            </a:r>
-          </a:p>
-          <a:p>
-            <a:pPr algn="l"/>
-            <a:r>
-              <a:rPr sz="1400" b="0">
-                <a:solidFill>
-                  <a:srgbClr val="FFFFFF"/>
-                </a:solidFill>
-              </a:rPr>
-              <a:t>Third bullet point to conclude.</a:t>
+              <a:t>This is the main content for the third slide. It provides an overview of the topic being discussed. This content spans multiple lines to demonstrate text wrapping within the text box.</a:t>
             </a:r>
           </a:p>
         </p:txBody>
       </p:sp>
       <p:pic>
         <p:nvPicPr>
-          <p:cNvPr id="8" name="Picture 7" descr="temp_image_2_0.png"/>
+          <p:cNvPr id="6" name="Picture 5" descr="temp_image_2_0.png"/>
           <p:cNvPicPr>
             <a:picLocks noChangeAspect="1"/>
           </p:cNvPicPr>
@@ -4829,79 +4724,7 @@
         <p:spPr>
           <a:xfrm>
             <a:off x="457200" y="457200"/>
-            <a:ext cx="5486400" cy="3200400"/>
-          </a:xfrm>
-          <a:prstGeom prst="rect">
-            <a:avLst/>
-          </a:prstGeom>
-        </p:spPr>
-      </p:pic>
-      <p:pic>
-        <p:nvPicPr>
-          <p:cNvPr id="9" name="Picture 8" descr="temp_image_2_1.png"/>
-          <p:cNvPicPr>
-            <a:picLocks noChangeAspect="1"/>
-          </p:cNvPicPr>
-          <p:nvPr/>
-        </p:nvPicPr>
-        <p:blipFill>
-          <a:blip r:embed="rId3"/>
-          <a:stretch>
-            <a:fillRect/>
-          </a:stretch>
-        </p:blipFill>
-        <p:spPr>
-          <a:xfrm>
-            <a:off x="457200" y="3749039"/>
-            <a:ext cx="5486400" cy="914400"/>
-          </a:xfrm>
-          <a:prstGeom prst="rect">
-            <a:avLst/>
-          </a:prstGeom>
-        </p:spPr>
-      </p:pic>
-      <p:pic>
-        <p:nvPicPr>
-          <p:cNvPr id="10" name="Picture 9" descr="temp_image_2_2.png"/>
-          <p:cNvPicPr>
-            <a:picLocks noChangeAspect="1"/>
-          </p:cNvPicPr>
-          <p:nvPr/>
-        </p:nvPicPr>
-        <p:blipFill>
-          <a:blip r:embed="rId4"/>
-          <a:stretch>
-            <a:fillRect/>
-          </a:stretch>
-        </p:blipFill>
-        <p:spPr>
-          <a:xfrm>
-            <a:off x="457200" y="4754880"/>
-            <a:ext cx="5486400" cy="914400"/>
-          </a:xfrm>
-          <a:prstGeom prst="rect">
-            <a:avLst/>
-          </a:prstGeom>
-        </p:spPr>
-      </p:pic>
-      <p:pic>
-        <p:nvPicPr>
-          <p:cNvPr id="11" name="Picture 10" descr="temp_image_2_3.png"/>
-          <p:cNvPicPr>
-            <a:picLocks noChangeAspect="1"/>
-          </p:cNvPicPr>
-          <p:nvPr/>
-        </p:nvPicPr>
-        <p:blipFill>
-          <a:blip r:embed="rId5"/>
-          <a:stretch>
-            <a:fillRect/>
-          </a:stretch>
-        </p:blipFill>
-        <p:spPr>
-          <a:xfrm>
-            <a:off x="457200" y="5760720"/>
-            <a:ext cx="5486400" cy="914400"/>
+            <a:ext cx="5486400" cy="5029200"/>
           </a:xfrm>
           <a:prstGeom prst="rect">
             <a:avLst/>

</xml_diff>